<commit_message>
add team slide and ask slide edit and improve existing deck add data
</commit_message>
<xml_diff>
--- a/brand-assets/pitch-deck/ChessWagerPitchDeck.pptx
+++ b/brand-assets/pitch-deck/ChessWagerPitchDeck.pptx
@@ -9,8 +9,10 @@
     <p:sldId id="258" r:id="rId3"/>
     <p:sldId id="259" r:id="rId4"/>
     <p:sldId id="260" r:id="rId5"/>
-    <p:sldId id="261" r:id="rId6"/>
-    <p:sldId id="257" r:id="rId7"/>
+    <p:sldId id="263" r:id="rId6"/>
+    <p:sldId id="261" r:id="rId7"/>
+    <p:sldId id="257" r:id="rId8"/>
+    <p:sldId id="262" r:id="rId9"/>
   </p:sldIdLst>
   <p:sldSz cx="12192000" cy="6858000"/>
   <p:notesSz cx="6858000" cy="9144000"/>
@@ -120,7 +122,8 @@
 <file path=ppt/revisionInfo.xml><?xml version="1.0" encoding="utf-8"?>
 <p1510:revInfo xmlns:a="http://schemas.openxmlformats.org/drawingml/2006/main" xmlns:r="http://schemas.openxmlformats.org/officeDocument/2006/relationships" xmlns:p1510="http://schemas.microsoft.com/office/powerpoint/2015/10/main">
   <p1510:revLst>
-    <p1510:client id="{58A15DB1-1793-46A9-B5F0-5597EEF90E0C}" v="369" dt="2024-09-09T21:29:44.947"/>
+    <p1510:client id="{162F0AE4-0C4E-4558-9C09-0037CDC717BB}" v="466" dt="2024-09-10T19:29:39.912"/>
+    <p1510:client id="{58A15DB1-1793-46A9-B5F0-5597EEF90E0C}" v="429" dt="2024-09-10T04:25:00.575"/>
   </p1510:revLst>
 </p1510:revInfo>
 </file>
@@ -256,7 +259,7 @@
           <a:p>
             <a:fld id="{846CE7D5-CF57-46EF-B807-FDD0502418D4}" type="datetimeFigureOut">
               <a:rPr lang="en-US" smtClean="0"/>
-              <a:t>9/9/2024</a:t>
+              <a:t>9/10/2024</a:t>
             </a:fld>
             <a:endParaRPr lang="en-US"/>
           </a:p>
@@ -426,7 +429,7 @@
           <a:p>
             <a:fld id="{846CE7D5-CF57-46EF-B807-FDD0502418D4}" type="datetimeFigureOut">
               <a:rPr lang="en-US" smtClean="0"/>
-              <a:t>9/9/2024</a:t>
+              <a:t>9/10/2024</a:t>
             </a:fld>
             <a:endParaRPr lang="en-US"/>
           </a:p>
@@ -606,7 +609,7 @@
           <a:p>
             <a:fld id="{846CE7D5-CF57-46EF-B807-FDD0502418D4}" type="datetimeFigureOut">
               <a:rPr lang="en-US" smtClean="0"/>
-              <a:t>9/9/2024</a:t>
+              <a:t>9/10/2024</a:t>
             </a:fld>
             <a:endParaRPr lang="en-US"/>
           </a:p>
@@ -776,7 +779,7 @@
           <a:p>
             <a:fld id="{846CE7D5-CF57-46EF-B807-FDD0502418D4}" type="datetimeFigureOut">
               <a:rPr lang="en-US" smtClean="0"/>
-              <a:t>9/9/2024</a:t>
+              <a:t>9/10/2024</a:t>
             </a:fld>
             <a:endParaRPr lang="en-US"/>
           </a:p>
@@ -1022,7 +1025,7 @@
           <a:p>
             <a:fld id="{846CE7D5-CF57-46EF-B807-FDD0502418D4}" type="datetimeFigureOut">
               <a:rPr lang="en-US" smtClean="0"/>
-              <a:t>9/9/2024</a:t>
+              <a:t>9/10/2024</a:t>
             </a:fld>
             <a:endParaRPr lang="en-US"/>
           </a:p>
@@ -1254,7 +1257,7 @@
           <a:p>
             <a:fld id="{846CE7D5-CF57-46EF-B807-FDD0502418D4}" type="datetimeFigureOut">
               <a:rPr lang="en-US" smtClean="0"/>
-              <a:t>9/9/2024</a:t>
+              <a:t>9/10/2024</a:t>
             </a:fld>
             <a:endParaRPr lang="en-US"/>
           </a:p>
@@ -1621,7 +1624,7 @@
           <a:p>
             <a:fld id="{846CE7D5-CF57-46EF-B807-FDD0502418D4}" type="datetimeFigureOut">
               <a:rPr lang="en-US" smtClean="0"/>
-              <a:t>9/9/2024</a:t>
+              <a:t>9/10/2024</a:t>
             </a:fld>
             <a:endParaRPr lang="en-US"/>
           </a:p>
@@ -1739,7 +1742,7 @@
           <a:p>
             <a:fld id="{846CE7D5-CF57-46EF-B807-FDD0502418D4}" type="datetimeFigureOut">
               <a:rPr lang="en-US" smtClean="0"/>
-              <a:t>9/9/2024</a:t>
+              <a:t>9/10/2024</a:t>
             </a:fld>
             <a:endParaRPr lang="en-US"/>
           </a:p>
@@ -1834,7 +1837,7 @@
           <a:p>
             <a:fld id="{846CE7D5-CF57-46EF-B807-FDD0502418D4}" type="datetimeFigureOut">
               <a:rPr lang="en-US" smtClean="0"/>
-              <a:t>9/9/2024</a:t>
+              <a:t>9/10/2024</a:t>
             </a:fld>
             <a:endParaRPr lang="en-US"/>
           </a:p>
@@ -2111,7 +2114,7 @@
           <a:p>
             <a:fld id="{846CE7D5-CF57-46EF-B807-FDD0502418D4}" type="datetimeFigureOut">
               <a:rPr lang="en-US" smtClean="0"/>
-              <a:t>9/9/2024</a:t>
+              <a:t>9/10/2024</a:t>
             </a:fld>
             <a:endParaRPr lang="en-US"/>
           </a:p>
@@ -2368,7 +2371,7 @@
           <a:p>
             <a:fld id="{846CE7D5-CF57-46EF-B807-FDD0502418D4}" type="datetimeFigureOut">
               <a:rPr lang="en-US" smtClean="0"/>
-              <a:t>9/9/2024</a:t>
+              <a:t>9/10/2024</a:t>
             </a:fld>
             <a:endParaRPr lang="en-US"/>
           </a:p>
@@ -2581,7 +2584,7 @@
           <a:p>
             <a:fld id="{846CE7D5-CF57-46EF-B807-FDD0502418D4}" type="datetimeFigureOut">
               <a:rPr lang="en-US" smtClean="0"/>
-              <a:t>9/9/2024</a:t>
+              <a:t>9/10/2024</a:t>
             </a:fld>
             <a:endParaRPr lang="en-US"/>
           </a:p>
@@ -3055,18 +3058,17 @@
                   </a:schemeClr>
                 </a:solidFill>
                 <a:latin typeface="Calibri"/>
-                <a:ea typeface="+mn-lt"/>
-                <a:cs typeface="+mn-lt"/>
+                <a:ea typeface="Calibri"/>
+                <a:cs typeface="Calibri"/>
               </a:rPr>
-              <a:t>Peer-to-peer betting platform with instant payouts.</a:t>
-            </a:r>
-            <a:endParaRPr lang="en-US">
+              <a:t>Instant payout betting platform</a:t>
+            </a:r>
+            <a:endParaRPr lang="en-US" dirty="0">
               <a:solidFill>
                 <a:schemeClr val="bg2">
                   <a:lumMod val="10000"/>
                 </a:schemeClr>
               </a:solidFill>
-              <a:latin typeface="Calibri"/>
               <a:ea typeface="Calibri"/>
               <a:cs typeface="Calibri"/>
             </a:endParaRPr>
@@ -3174,6 +3176,16 @@
             </a:r>
           </a:p>
           <a:p>
+            <a:endParaRPr lang="en-US" dirty="0">
+              <a:solidFill>
+                <a:srgbClr val="171717"/>
+              </a:solidFill>
+              <a:latin typeface="Calibri"/>
+              <a:ea typeface="Calibri"/>
+              <a:cs typeface="Calibri"/>
+            </a:endParaRPr>
+          </a:p>
+          <a:p>
             <a:r>
               <a:rPr lang="en-US" dirty="0">
                 <a:solidFill>
@@ -3289,6 +3301,16 @@
             </a:r>
           </a:p>
           <a:p>
+            <a:endParaRPr lang="en-US" dirty="0">
+              <a:solidFill>
+                <a:srgbClr val="171717"/>
+              </a:solidFill>
+              <a:latin typeface="Calibri"/>
+              <a:ea typeface="Calibri"/>
+              <a:cs typeface="Calibri"/>
+            </a:endParaRPr>
+          </a:p>
+          <a:p>
             <a:r>
               <a:rPr lang="en-US" dirty="0">
                 <a:solidFill>
@@ -3298,7 +3320,7 @@
                 <a:ea typeface="Calibri"/>
                 <a:cs typeface="Calibri"/>
               </a:rPr>
-              <a:t>Get paid automatically and immediately using a smart contract to execute all actions</a:t>
+              <a:t>Get paid automatically and immediately</a:t>
             </a:r>
           </a:p>
           <a:p>
@@ -3399,7 +3421,7 @@
           <a:lstStyle/>
           <a:p>
             <a:r>
-              <a:rPr lang="en-US">
+              <a:rPr lang="en-US" dirty="0">
                 <a:solidFill>
                   <a:srgbClr val="171717"/>
                 </a:solidFill>
@@ -3407,7 +3429,52 @@
                 <a:ea typeface="Calibri"/>
                 <a:cs typeface="Calibri"/>
               </a:rPr>
-              <a:t>We take 4.5% of every winning bet</a:t>
+              <a:t>We take 4.5% of the payout pool for each bet</a:t>
+            </a:r>
+          </a:p>
+          <a:p>
+            <a:endParaRPr lang="en-US" dirty="0">
+              <a:solidFill>
+                <a:srgbClr val="171717"/>
+              </a:solidFill>
+              <a:latin typeface="Calibri"/>
+              <a:ea typeface="Calibri"/>
+              <a:cs typeface="Calibri"/>
+            </a:endParaRPr>
+          </a:p>
+          <a:p>
+            <a:r>
+              <a:rPr lang="en-US" dirty="0">
+                <a:solidFill>
+                  <a:srgbClr val="171717"/>
+                </a:solidFill>
+                <a:latin typeface="Calibri"/>
+                <a:ea typeface="Calibri"/>
+                <a:cs typeface="Calibri"/>
+              </a:rPr>
+              <a:t>Typical </a:t>
+            </a:r>
+            <a:r>
+              <a:rPr lang="en-US" dirty="0" err="1">
+                <a:solidFill>
+                  <a:srgbClr val="171717"/>
+                </a:solidFill>
+                <a:latin typeface="Calibri"/>
+                <a:ea typeface="Calibri"/>
+                <a:cs typeface="Calibri"/>
+              </a:rPr>
+              <a:t>vigs</a:t>
+            </a:r>
+            <a:r>
+              <a:rPr lang="en-US" dirty="0">
+                <a:solidFill>
+                  <a:srgbClr val="171717"/>
+                </a:solidFill>
+                <a:latin typeface="Calibri"/>
+                <a:ea typeface="Calibri"/>
+                <a:cs typeface="Calibri"/>
+              </a:rPr>
+              <a:t> calculated by FanDuel and DraftKings are 4.76% - 10%</a:t>
             </a:r>
           </a:p>
         </p:txBody>
@@ -3447,7 +3514,7 @@
           <p:cNvPr id="2" name="Title 1">
             <a:extLst>
               <a:ext uri="{FF2B5EF4-FFF2-40B4-BE49-F238E27FC236}">
-                <a16:creationId xmlns:a16="http://schemas.microsoft.com/office/drawing/2014/main" id="{672DC23D-D9A3-D8F8-E8BE-EC9A61771210}"/>
+                <a16:creationId xmlns:a16="http://schemas.microsoft.com/office/drawing/2014/main" id="{B2C9DB43-6D79-85CA-8EBF-C12B2F7C8876}"/>
               </a:ext>
             </a:extLst>
           </p:cNvPr>
@@ -3469,7 +3536,7 @@
                 <a:ea typeface="Calibri"/>
                 <a:cs typeface="Calibri"/>
               </a:rPr>
-              <a:t>Market Validation</a:t>
+              <a:t>Our Team</a:t>
             </a:r>
             <a:endParaRPr lang="en-US" dirty="0">
               <a:latin typeface="Calibri"/>
@@ -3484,7 +3551,7 @@
           <p:cNvPr id="3" name="Content Placeholder 2">
             <a:extLst>
               <a:ext uri="{FF2B5EF4-FFF2-40B4-BE49-F238E27FC236}">
-                <a16:creationId xmlns:a16="http://schemas.microsoft.com/office/drawing/2014/main" id="{98FA3155-6D78-AF21-A57F-0027ACDF695A}"/>
+                <a16:creationId xmlns:a16="http://schemas.microsoft.com/office/drawing/2014/main" id="{F4A3E1B4-41EE-6248-5481-2B29FCFFF7F2}"/>
               </a:ext>
             </a:extLst>
           </p:cNvPr>
@@ -3497,21 +3564,75 @@
         </p:nvSpPr>
         <p:spPr/>
         <p:txBody>
-          <a:bodyPr/>
-          <a:lstStyle/>
-          <a:p>
-            <a:endParaRPr lang="en-US">
+          <a:bodyPr vert="horz" lIns="91440" tIns="45720" rIns="91440" bIns="45720" rtlCol="0" anchor="t">
+            <a:normAutofit/>
+          </a:bodyPr>
+          <a:lstStyle/>
+          <a:p>
+            <a:r>
+              <a:rPr lang="en-US" dirty="0">
+                <a:latin typeface="Calibri"/>
+                <a:ea typeface="Calibri"/>
+                <a:cs typeface="Calibri"/>
+              </a:rPr>
+              <a:t>Terry Dorsey</a:t>
+            </a:r>
+          </a:p>
+          <a:p>
+            <a:pPr lvl="1">
+              <a:buFont typeface="Courier New" panose="020B0604020202020204" pitchFamily="34" charset="0"/>
+              <a:buChar char="o"/>
+            </a:pPr>
+            <a:r>
+              <a:rPr lang="en-US" dirty="0">
+                <a:latin typeface="Calibri"/>
+                <a:ea typeface="Calibri"/>
+                <a:cs typeface="Calibri"/>
+              </a:rPr>
+              <a:t>Creator, Owner, CEO, CTO</a:t>
+            </a:r>
+          </a:p>
+          <a:p>
+            <a:pPr lvl="1">
+              <a:buFont typeface="Courier New" panose="020B0604020202020204" pitchFamily="34" charset="0"/>
+              <a:buChar char="o"/>
+            </a:pPr>
+            <a:endParaRPr lang="en-US" dirty="0">
               <a:latin typeface="Calibri"/>
               <a:ea typeface="Calibri"/>
               <a:cs typeface="Calibri"/>
             </a:endParaRPr>
           </a:p>
+          <a:p>
+            <a:r>
+              <a:rPr lang="en-US" dirty="0">
+                <a:latin typeface="Calibri"/>
+                <a:ea typeface="Calibri"/>
+                <a:cs typeface="Calibri"/>
+              </a:rPr>
+              <a:t>Kirstie Wilkinson</a:t>
+            </a:r>
+          </a:p>
+          <a:p>
+            <a:pPr lvl="1">
+              <a:buFont typeface="Courier New" panose="020B0604020202020204" pitchFamily="34" charset="0"/>
+              <a:buChar char="o"/>
+            </a:pPr>
+            <a:r>
+              <a:rPr lang="en-US" dirty="0">
+                <a:latin typeface="Calibri"/>
+                <a:ea typeface="Calibri"/>
+                <a:cs typeface="Calibri"/>
+              </a:rPr>
+              <a:t>Developer, Design Consultant</a:t>
+            </a:r>
+          </a:p>
         </p:txBody>
       </p:sp>
     </p:spTree>
     <p:extLst>
       <p:ext uri="{BB962C8B-B14F-4D97-AF65-F5344CB8AC3E}">
-        <p14:creationId xmlns:p14="http://schemas.microsoft.com/office/powerpoint/2010/main" val="3581935933"/>
+        <p14:creationId xmlns:p14="http://schemas.microsoft.com/office/powerpoint/2010/main" val="627267121"/>
       </p:ext>
     </p:extLst>
   </p:cSld>
@@ -3543,6 +3664,181 @@
           <p:cNvPr id="2" name="Title 1">
             <a:extLst>
               <a:ext uri="{FF2B5EF4-FFF2-40B4-BE49-F238E27FC236}">
+                <a16:creationId xmlns:a16="http://schemas.microsoft.com/office/drawing/2014/main" id="{672DC23D-D9A3-D8F8-E8BE-EC9A61771210}"/>
+              </a:ext>
+            </a:extLst>
+          </p:cNvPr>
+          <p:cNvSpPr>
+            <a:spLocks noGrp="1"/>
+          </p:cNvSpPr>
+          <p:nvPr>
+            <p:ph type="title"/>
+          </p:nvPr>
+        </p:nvSpPr>
+        <p:spPr/>
+        <p:txBody>
+          <a:bodyPr/>
+          <a:lstStyle/>
+          <a:p>
+            <a:r>
+              <a:rPr lang="en-US" b="1" dirty="0">
+                <a:latin typeface="Calibri"/>
+                <a:ea typeface="Calibri"/>
+                <a:cs typeface="Calibri"/>
+              </a:rPr>
+              <a:t>Market Validation</a:t>
+            </a:r>
+            <a:endParaRPr lang="en-US" dirty="0">
+              <a:latin typeface="Calibri"/>
+              <a:ea typeface="Calibri"/>
+              <a:cs typeface="Calibri"/>
+            </a:endParaRPr>
+          </a:p>
+        </p:txBody>
+      </p:sp>
+      <p:sp>
+        <p:nvSpPr>
+          <p:cNvPr id="3" name="Content Placeholder 2">
+            <a:extLst>
+              <a:ext uri="{FF2B5EF4-FFF2-40B4-BE49-F238E27FC236}">
+                <a16:creationId xmlns:a16="http://schemas.microsoft.com/office/drawing/2014/main" id="{98FA3155-6D78-AF21-A57F-0027ACDF695A}"/>
+              </a:ext>
+            </a:extLst>
+          </p:cNvPr>
+          <p:cNvSpPr>
+            <a:spLocks noGrp="1"/>
+          </p:cNvSpPr>
+          <p:nvPr>
+            <p:ph idx="1"/>
+          </p:nvPr>
+        </p:nvSpPr>
+        <p:spPr/>
+        <p:txBody>
+          <a:bodyPr vert="horz" lIns="91440" tIns="45720" rIns="91440" bIns="45720" rtlCol="0" anchor="t">
+            <a:normAutofit/>
+          </a:bodyPr>
+          <a:lstStyle/>
+          <a:p>
+            <a:r>
+              <a:rPr lang="en-US" dirty="0">
+                <a:latin typeface="Calibri"/>
+                <a:ea typeface="Calibri"/>
+                <a:cs typeface="Calibri"/>
+              </a:rPr>
+              <a:t>How's FanDuel?</a:t>
+            </a:r>
+          </a:p>
+          <a:p>
+            <a:endParaRPr lang="en-US" dirty="0">
+              <a:latin typeface="Calibri"/>
+              <a:ea typeface="Calibri"/>
+              <a:cs typeface="Calibri"/>
+            </a:endParaRPr>
+          </a:p>
+          <a:p>
+            <a:r>
+              <a:rPr lang="en-US" dirty="0">
+                <a:latin typeface="Calibri"/>
+                <a:ea typeface="Calibri"/>
+                <a:cs typeface="Calibri"/>
+              </a:rPr>
+              <a:t>DraftKings?</a:t>
+            </a:r>
+          </a:p>
+          <a:p>
+            <a:endParaRPr lang="en-US" dirty="0">
+              <a:latin typeface="Calibri"/>
+              <a:ea typeface="Calibri"/>
+              <a:cs typeface="Calibri"/>
+            </a:endParaRPr>
+          </a:p>
+          <a:p>
+            <a:r>
+              <a:rPr lang="en-US" dirty="0" err="1">
+                <a:latin typeface="Calibri"/>
+                <a:ea typeface="Calibri"/>
+                <a:cs typeface="Calibri"/>
+              </a:rPr>
+              <a:t>BetMGM</a:t>
+            </a:r>
+            <a:r>
+              <a:rPr lang="en-US" dirty="0">
+                <a:latin typeface="Calibri"/>
+                <a:ea typeface="Calibri"/>
+                <a:cs typeface="Calibri"/>
+              </a:rPr>
+              <a:t>, Caesars Sportsbook, </a:t>
+            </a:r>
+            <a:r>
+              <a:rPr lang="en-US" dirty="0" err="1">
+                <a:latin typeface="Calibri"/>
+                <a:ea typeface="Calibri"/>
+                <a:cs typeface="Calibri"/>
+              </a:rPr>
+              <a:t>PointsBet</a:t>
+            </a:r>
+            <a:r>
+              <a:rPr lang="en-US" dirty="0">
+                <a:latin typeface="Calibri"/>
+                <a:ea typeface="Calibri"/>
+                <a:cs typeface="Calibri"/>
+              </a:rPr>
+              <a:t>, Barstool Sportsbook, </a:t>
+            </a:r>
+            <a:r>
+              <a:rPr lang="en-US" dirty="0" err="1">
+                <a:latin typeface="Calibri"/>
+                <a:ea typeface="Calibri"/>
+                <a:cs typeface="Calibri"/>
+              </a:rPr>
+              <a:t>BetRivers</a:t>
+            </a:r>
+            <a:r>
+              <a:rPr lang="en-US" dirty="0">
+                <a:latin typeface="Calibri"/>
+                <a:ea typeface="Calibri"/>
+                <a:cs typeface="Calibri"/>
+              </a:rPr>
+              <a:t>, FOX Bet</a:t>
+            </a:r>
+          </a:p>
+        </p:txBody>
+      </p:sp>
+    </p:spTree>
+    <p:extLst>
+      <p:ext uri="{BB962C8B-B14F-4D97-AF65-F5344CB8AC3E}">
+        <p14:creationId xmlns:p14="http://schemas.microsoft.com/office/powerpoint/2010/main" val="3581935933"/>
+      </p:ext>
+    </p:extLst>
+  </p:cSld>
+  <p:clrMapOvr>
+    <a:masterClrMapping/>
+  </p:clrMapOvr>
+</p:sld>
+</file>
+
+<file path=ppt/slides/slide7.xml><?xml version="1.0" encoding="utf-8"?>
+<p:sld xmlns:a="http://schemas.openxmlformats.org/drawingml/2006/main" xmlns:r="http://schemas.openxmlformats.org/officeDocument/2006/relationships" xmlns:p="http://schemas.openxmlformats.org/presentationml/2006/main">
+  <p:cSld>
+    <p:spTree>
+      <p:nvGrpSpPr>
+        <p:cNvPr id="1" name=""/>
+        <p:cNvGrpSpPr/>
+        <p:nvPr/>
+      </p:nvGrpSpPr>
+      <p:grpSpPr>
+        <a:xfrm>
+          <a:off x="0" y="0"/>
+          <a:ext cx="0" cy="0"/>
+          <a:chOff x="0" y="0"/>
+          <a:chExt cx="0" cy="0"/>
+        </a:xfrm>
+      </p:grpSpPr>
+      <p:sp>
+        <p:nvSpPr>
+          <p:cNvPr id="2" name="Title 1">
+            <a:extLst>
+              <a:ext uri="{FF2B5EF4-FFF2-40B4-BE49-F238E27FC236}">
                 <a16:creationId xmlns:a16="http://schemas.microsoft.com/office/drawing/2014/main" id="{42E68F69-B2D6-AA67-6492-F4BD1D49458E}"/>
               </a:ext>
             </a:extLst>
@@ -3605,10 +3901,33 @@
                 <a:ea typeface="Calibri"/>
                 <a:cs typeface="Calibri"/>
               </a:rPr>
+              <a:t>For Users</a:t>
+            </a:r>
+            <a:endParaRPr lang="en-US" dirty="0"/>
+          </a:p>
+          <a:p>
+            <a:pPr lvl="1">
+              <a:buFont typeface="Courier New" panose="020B0604020202020204" pitchFamily="34" charset="0"/>
+              <a:buChar char="o"/>
+            </a:pPr>
+            <a:r>
+              <a:rPr lang="en-US" dirty="0">
+                <a:solidFill>
+                  <a:srgbClr val="171717"/>
+                </a:solidFill>
+                <a:latin typeface="Calibri"/>
+                <a:ea typeface="Calibri"/>
+                <a:cs typeface="Calibri"/>
+              </a:rPr>
               <a:t>No waiting for winnings</a:t>
             </a:r>
-          </a:p>
-          <a:p>
+            <a:endParaRPr lang="en-US" dirty="0"/>
+          </a:p>
+          <a:p>
+            <a:pPr lvl="1">
+              <a:buFont typeface="Courier New" panose="020B0604020202020204" pitchFamily="34" charset="0"/>
+              <a:buChar char="o"/>
+            </a:pPr>
             <a:r>
               <a:rPr lang="en-US" dirty="0">
                 <a:solidFill>
@@ -3622,6 +3941,10 @@
             </a:r>
           </a:p>
           <a:p>
+            <a:pPr lvl="1">
+              <a:buFont typeface="Courier New" panose="020B0604020202020204" pitchFamily="34" charset="0"/>
+              <a:buChar char="o"/>
+            </a:pPr>
             <a:r>
               <a:rPr lang="en-US" dirty="0">
                 <a:solidFill>
@@ -3631,7 +3954,54 @@
                 <a:ea typeface="Calibri"/>
                 <a:cs typeface="Calibri"/>
               </a:rPr>
-              <a:t>Real people win every time</a:t>
+              <a:t>Continuous engagement through chatting with and betting against real people</a:t>
+            </a:r>
+          </a:p>
+          <a:p>
+            <a:r>
+              <a:rPr lang="en-US" dirty="0">
+                <a:solidFill>
+                  <a:srgbClr val="171717"/>
+                </a:solidFill>
+                <a:latin typeface="Calibri"/>
+                <a:ea typeface="Calibri"/>
+                <a:cs typeface="Calibri"/>
+              </a:rPr>
+              <a:t>For Us</a:t>
+            </a:r>
+          </a:p>
+          <a:p>
+            <a:pPr lvl="1">
+              <a:buFont typeface="Courier New" panose="020B0604020202020204" pitchFamily="34" charset="0"/>
+              <a:buChar char="o"/>
+            </a:pPr>
+            <a:r>
+              <a:rPr lang="en-US" dirty="0">
+                <a:solidFill>
+                  <a:srgbClr val="171717"/>
+                </a:solidFill>
+                <a:latin typeface="Calibri"/>
+                <a:ea typeface="Calibri"/>
+                <a:cs typeface="Calibri"/>
+              </a:rPr>
+              <a:t>No risk (they can't beat the house)</a:t>
+            </a:r>
+          </a:p>
+          <a:p>
+            <a:pPr lvl="1">
+              <a:buFont typeface="Courier New" panose="020B0604020202020204" pitchFamily="34" charset="0"/>
+              <a:buChar char="o"/>
+            </a:pPr>
+            <a:r>
+              <a:rPr lang="en-US" dirty="0">
+                <a:solidFill>
+                  <a:srgbClr val="171717"/>
+                </a:solidFill>
+                <a:latin typeface="Calibri"/>
+                <a:ea typeface="Calibri"/>
+                <a:cs typeface="Calibri"/>
+              </a:rPr>
+              <a:t>No liability (smart contract means we don't hold their money)</a:t>
             </a:r>
           </a:p>
           <a:p>
@@ -3654,35 +4024,139 @@
               <a:cs typeface="Calibri"/>
             </a:endParaRPr>
           </a:p>
-          <a:p>
-            <a:r>
-              <a:rPr lang="en-US" dirty="0">
-                <a:solidFill>
-                  <a:srgbClr val="171717"/>
-                </a:solidFill>
+        </p:txBody>
+      </p:sp>
+    </p:spTree>
+    <p:extLst>
+      <p:ext uri="{BB962C8B-B14F-4D97-AF65-F5344CB8AC3E}">
+        <p14:creationId xmlns:p14="http://schemas.microsoft.com/office/powerpoint/2010/main" val="4081512316"/>
+      </p:ext>
+    </p:extLst>
+  </p:cSld>
+  <p:clrMapOvr>
+    <a:masterClrMapping/>
+  </p:clrMapOvr>
+</p:sld>
+</file>
+
+<file path=ppt/slides/slide8.xml><?xml version="1.0" encoding="utf-8"?>
+<p:sld xmlns:a="http://schemas.openxmlformats.org/drawingml/2006/main" xmlns:r="http://schemas.openxmlformats.org/officeDocument/2006/relationships" xmlns:p="http://schemas.openxmlformats.org/presentationml/2006/main">
+  <p:cSld>
+    <p:spTree>
+      <p:nvGrpSpPr>
+        <p:cNvPr id="1" name=""/>
+        <p:cNvGrpSpPr/>
+        <p:nvPr/>
+      </p:nvGrpSpPr>
+      <p:grpSpPr>
+        <a:xfrm>
+          <a:off x="0" y="0"/>
+          <a:ext cx="0" cy="0"/>
+          <a:chOff x="0" y="0"/>
+          <a:chExt cx="0" cy="0"/>
+        </a:xfrm>
+      </p:grpSpPr>
+      <p:sp>
+        <p:nvSpPr>
+          <p:cNvPr id="2" name="Title 1">
+            <a:extLst>
+              <a:ext uri="{FF2B5EF4-FFF2-40B4-BE49-F238E27FC236}">
+                <a16:creationId xmlns:a16="http://schemas.microsoft.com/office/drawing/2014/main" id="{64A08D3D-2074-E53B-0CEA-FE1F26F173A2}"/>
+              </a:ext>
+            </a:extLst>
+          </p:cNvPr>
+          <p:cNvSpPr>
+            <a:spLocks noGrp="1"/>
+          </p:cNvSpPr>
+          <p:nvPr>
+            <p:ph type="title"/>
+          </p:nvPr>
+        </p:nvSpPr>
+        <p:spPr/>
+        <p:txBody>
+          <a:bodyPr/>
+          <a:lstStyle/>
+          <a:p>
+            <a:r>
+              <a:rPr lang="en-US" b="1" dirty="0">
                 <a:latin typeface="Calibri"/>
                 <a:ea typeface="Calibri"/>
                 <a:cs typeface="Calibri"/>
               </a:rPr>
-              <a:t>Talk smack in chat, then put your money where your mouth is (driving user engagement)</a:t>
-            </a:r>
-          </a:p>
-          <a:p>
-            <a:endParaRPr lang="en-US" dirty="0">
-              <a:solidFill>
-                <a:srgbClr val="171717"/>
-              </a:solidFill>
-              <a:latin typeface="Calibri"/>
-              <a:ea typeface="Calibri"/>
-              <a:cs typeface="Calibri"/>
-            </a:endParaRPr>
+              <a:t>Ask: We need $______</a:t>
+            </a:r>
+            <a:endParaRPr lang="en-US" dirty="0"/>
+          </a:p>
+        </p:txBody>
+      </p:sp>
+      <p:sp>
+        <p:nvSpPr>
+          <p:cNvPr id="3" name="Content Placeholder 2">
+            <a:extLst>
+              <a:ext uri="{FF2B5EF4-FFF2-40B4-BE49-F238E27FC236}">
+                <a16:creationId xmlns:a16="http://schemas.microsoft.com/office/drawing/2014/main" id="{F1E97628-BAA7-0072-2569-A8143E293881}"/>
+              </a:ext>
+            </a:extLst>
+          </p:cNvPr>
+          <p:cNvSpPr>
+            <a:spLocks noGrp="1"/>
+          </p:cNvSpPr>
+          <p:nvPr>
+            <p:ph idx="1"/>
+          </p:nvPr>
+        </p:nvSpPr>
+        <p:spPr/>
+        <p:txBody>
+          <a:bodyPr vert="horz" lIns="91440" tIns="45720" rIns="91440" bIns="45720" rtlCol="0" anchor="t">
+            <a:normAutofit/>
+          </a:bodyPr>
+          <a:lstStyle/>
+          <a:p>
+            <a:r>
+              <a:rPr lang="en-US" dirty="0">
+                <a:latin typeface="Calibri"/>
+                <a:ea typeface="Calibri"/>
+                <a:cs typeface="Calibri"/>
+              </a:rPr>
+              <a:t>Why? What will we do with it?</a:t>
+            </a:r>
+            <a:endParaRPr lang="en-US" dirty="0"/>
+          </a:p>
+          <a:p>
+            <a:pPr lvl="1">
+              <a:buFont typeface="Courier New" panose="020B0604020202020204" pitchFamily="34" charset="0"/>
+              <a:buChar char="o"/>
+            </a:pPr>
+            <a:r>
+              <a:rPr lang="en-US" dirty="0">
+                <a:latin typeface="Calibri"/>
+                <a:ea typeface="Calibri"/>
+                <a:cs typeface="Calibri"/>
+              </a:rPr>
+              <a:t>If hire people, why?</a:t>
+            </a:r>
+            <a:endParaRPr lang="en-US" dirty="0"/>
+          </a:p>
+          <a:p>
+            <a:pPr lvl="1">
+              <a:buFont typeface="Courier New" panose="020B0604020202020204" pitchFamily="34" charset="0"/>
+              <a:buChar char="o"/>
+            </a:pPr>
+            <a:r>
+              <a:rPr lang="en-US" dirty="0">
+                <a:latin typeface="Calibri"/>
+                <a:ea typeface="Calibri"/>
+                <a:cs typeface="Calibri"/>
+              </a:rPr>
+              <a:t>What are our goals/milestones?</a:t>
+            </a:r>
           </a:p>
         </p:txBody>
       </p:sp>
     </p:spTree>
     <p:extLst>
       <p:ext uri="{BB962C8B-B14F-4D97-AF65-F5344CB8AC3E}">
-        <p14:creationId xmlns:p14="http://schemas.microsoft.com/office/powerpoint/2010/main" val="4081512316"/>
+        <p14:creationId xmlns:p14="http://schemas.microsoft.com/office/powerpoint/2010/main" val="4251907771"/>
       </p:ext>
     </p:extLst>
   </p:cSld>

</xml_diff>

<commit_message>
add data to market validation slide
</commit_message>
<xml_diff>
--- a/brand-assets/pitch-deck/ChessWagerPitchDeck.pptx
+++ b/brand-assets/pitch-deck/ChessWagerPitchDeck.pptx
@@ -122,8 +122,7 @@
 <file path=ppt/revisionInfo.xml><?xml version="1.0" encoding="utf-8"?>
 <p1510:revInfo xmlns:a="http://schemas.openxmlformats.org/drawingml/2006/main" xmlns:r="http://schemas.openxmlformats.org/officeDocument/2006/relationships" xmlns:p1510="http://schemas.microsoft.com/office/powerpoint/2015/10/main">
   <p1510:revLst>
-    <p1510:client id="{162F0AE4-0C4E-4558-9C09-0037CDC717BB}" v="466" dt="2024-09-10T19:29:39.912"/>
-    <p1510:client id="{58A15DB1-1793-46A9-B5F0-5597EEF90E0C}" v="429" dt="2024-09-10T04:25:00.575"/>
+    <p1510:client id="{1AC1F2C2-5A44-445C-8FCF-DDB3EDB04908}" v="272" dt="2024-09-18T00:26:35.851"/>
   </p1510:revLst>
 </p1510:revInfo>
 </file>
@@ -259,7 +258,7 @@
           <a:p>
             <a:fld id="{846CE7D5-CF57-46EF-B807-FDD0502418D4}" type="datetimeFigureOut">
               <a:rPr lang="en-US" smtClean="0"/>
-              <a:t>9/10/2024</a:t>
+              <a:t>9/17/2024</a:t>
             </a:fld>
             <a:endParaRPr lang="en-US"/>
           </a:p>
@@ -429,7 +428,7 @@
           <a:p>
             <a:fld id="{846CE7D5-CF57-46EF-B807-FDD0502418D4}" type="datetimeFigureOut">
               <a:rPr lang="en-US" smtClean="0"/>
-              <a:t>9/10/2024</a:t>
+              <a:t>9/17/2024</a:t>
             </a:fld>
             <a:endParaRPr lang="en-US"/>
           </a:p>
@@ -609,7 +608,7 @@
           <a:p>
             <a:fld id="{846CE7D5-CF57-46EF-B807-FDD0502418D4}" type="datetimeFigureOut">
               <a:rPr lang="en-US" smtClean="0"/>
-              <a:t>9/10/2024</a:t>
+              <a:t>9/17/2024</a:t>
             </a:fld>
             <a:endParaRPr lang="en-US"/>
           </a:p>
@@ -779,7 +778,7 @@
           <a:p>
             <a:fld id="{846CE7D5-CF57-46EF-B807-FDD0502418D4}" type="datetimeFigureOut">
               <a:rPr lang="en-US" smtClean="0"/>
-              <a:t>9/10/2024</a:t>
+              <a:t>9/17/2024</a:t>
             </a:fld>
             <a:endParaRPr lang="en-US"/>
           </a:p>
@@ -1025,7 +1024,7 @@
           <a:p>
             <a:fld id="{846CE7D5-CF57-46EF-B807-FDD0502418D4}" type="datetimeFigureOut">
               <a:rPr lang="en-US" smtClean="0"/>
-              <a:t>9/10/2024</a:t>
+              <a:t>9/17/2024</a:t>
             </a:fld>
             <a:endParaRPr lang="en-US"/>
           </a:p>
@@ -1257,7 +1256,7 @@
           <a:p>
             <a:fld id="{846CE7D5-CF57-46EF-B807-FDD0502418D4}" type="datetimeFigureOut">
               <a:rPr lang="en-US" smtClean="0"/>
-              <a:t>9/10/2024</a:t>
+              <a:t>9/17/2024</a:t>
             </a:fld>
             <a:endParaRPr lang="en-US"/>
           </a:p>
@@ -1624,7 +1623,7 @@
           <a:p>
             <a:fld id="{846CE7D5-CF57-46EF-B807-FDD0502418D4}" type="datetimeFigureOut">
               <a:rPr lang="en-US" smtClean="0"/>
-              <a:t>9/10/2024</a:t>
+              <a:t>9/17/2024</a:t>
             </a:fld>
             <a:endParaRPr lang="en-US"/>
           </a:p>
@@ -1742,7 +1741,7 @@
           <a:p>
             <a:fld id="{846CE7D5-CF57-46EF-B807-FDD0502418D4}" type="datetimeFigureOut">
               <a:rPr lang="en-US" smtClean="0"/>
-              <a:t>9/10/2024</a:t>
+              <a:t>9/17/2024</a:t>
             </a:fld>
             <a:endParaRPr lang="en-US"/>
           </a:p>
@@ -1837,7 +1836,7 @@
           <a:p>
             <a:fld id="{846CE7D5-CF57-46EF-B807-FDD0502418D4}" type="datetimeFigureOut">
               <a:rPr lang="en-US" smtClean="0"/>
-              <a:t>9/10/2024</a:t>
+              <a:t>9/17/2024</a:t>
             </a:fld>
             <a:endParaRPr lang="en-US"/>
           </a:p>
@@ -2114,7 +2113,7 @@
           <a:p>
             <a:fld id="{846CE7D5-CF57-46EF-B807-FDD0502418D4}" type="datetimeFigureOut">
               <a:rPr lang="en-US" smtClean="0"/>
-              <a:t>9/10/2024</a:t>
+              <a:t>9/17/2024</a:t>
             </a:fld>
             <a:endParaRPr lang="en-US"/>
           </a:p>
@@ -2371,7 +2370,7 @@
           <a:p>
             <a:fld id="{846CE7D5-CF57-46EF-B807-FDD0502418D4}" type="datetimeFigureOut">
               <a:rPr lang="en-US" smtClean="0"/>
-              <a:t>9/10/2024</a:t>
+              <a:t>9/17/2024</a:t>
             </a:fld>
             <a:endParaRPr lang="en-US"/>
           </a:p>
@@ -2584,7 +2583,7 @@
           <a:p>
             <a:fld id="{846CE7D5-CF57-46EF-B807-FDD0502418D4}" type="datetimeFigureOut">
               <a:rPr lang="en-US" smtClean="0"/>
-              <a:t>9/10/2024</a:t>
+              <a:t>9/17/2024</a:t>
             </a:fld>
             <a:endParaRPr lang="en-US"/>
           </a:p>
@@ -3715,20 +3714,27 @@
         <p:spPr/>
         <p:txBody>
           <a:bodyPr vert="horz" lIns="91440" tIns="45720" rIns="91440" bIns="45720" rtlCol="0" anchor="t">
-            <a:normAutofit/>
+            <a:normAutofit fontScale="92500" lnSpcReduction="20000"/>
           </a:bodyPr>
           <a:lstStyle/>
           <a:p>
             <a:r>
+              <a:rPr lang="en-US">
+                <a:latin typeface="Calibri"/>
+                <a:ea typeface="Calibri"/>
+                <a:cs typeface="Calibri"/>
+              </a:rPr>
+              <a:t>US sport betting revenue reached $7.4 billion in 2022 </a:t>
+            </a:r>
+            <a:r>
               <a:rPr lang="en-US" dirty="0">
                 <a:latin typeface="Calibri"/>
                 <a:ea typeface="Calibri"/>
                 <a:cs typeface="Calibri"/>
-              </a:rPr>
-              <a:t>How's FanDuel?</a:t>
-            </a:r>
-          </a:p>
-          <a:p>
+                <a:hlinkClick r:id="rId2"/>
+              </a:rPr>
+              <a:t>source</a:t>
+            </a:r>
             <a:endParaRPr lang="en-US" dirty="0">
               <a:latin typeface="Calibri"/>
               <a:ea typeface="Calibri"/>
@@ -3737,15 +3743,46 @@
           </a:p>
           <a:p>
             <a:r>
+              <a:rPr lang="en-US">
+                <a:latin typeface="Calibri"/>
+                <a:ea typeface="Calibri"/>
+                <a:cs typeface="Calibri"/>
+              </a:rPr>
+              <a:t>FanDuel</a:t>
+            </a:r>
+            <a:endParaRPr lang="en-US">
+              <a:latin typeface="Aptos" panose="020B0004020202020204"/>
+              <a:ea typeface="Calibri"/>
+              <a:cs typeface="Calibri"/>
+            </a:endParaRPr>
+          </a:p>
+          <a:p>
+            <a:pPr lvl="1">
+              <a:buFont typeface="Courier New" panose="020B0604020202020204" pitchFamily="34" charset="0"/>
+              <a:buChar char="o"/>
+            </a:pPr>
+            <a:r>
               <a:rPr lang="en-US" dirty="0">
                 <a:latin typeface="Calibri"/>
                 <a:ea typeface="Calibri"/>
                 <a:cs typeface="Calibri"/>
               </a:rPr>
-              <a:t>DraftKings?</a:t>
-            </a:r>
-          </a:p>
-          <a:p>
+              <a:t>3 million users in 2022</a:t>
+            </a:r>
+          </a:p>
+          <a:p>
+            <a:pPr lvl="1">
+              <a:buFont typeface="Courier New" panose="020B0604020202020204" pitchFamily="34" charset="0"/>
+              <a:buChar char="o"/>
+            </a:pPr>
+            <a:r>
+              <a:rPr lang="en-US" sz="2000" dirty="0">
+                <a:latin typeface="Calibri"/>
+                <a:ea typeface="Calibri"/>
+                <a:cs typeface="Calibri"/>
+              </a:rPr>
+              <a:t>$3.23 billion in revenue</a:t>
+            </a:r>
             <a:endParaRPr lang="en-US" dirty="0">
               <a:latin typeface="Calibri"/>
               <a:ea typeface="Calibri"/>
@@ -3753,8 +3790,97 @@
             </a:endParaRPr>
           </a:p>
           <a:p>
-            <a:r>
-              <a:rPr lang="en-US" dirty="0" err="1">
+            <a:pPr lvl="2">
+              <a:buFont typeface="Wingdings" panose="020B0604020202020204" pitchFamily="34" charset="0"/>
+              <a:buChar char="§"/>
+            </a:pPr>
+            <a:r>
+              <a:rPr lang="en-US" sz="1600" dirty="0">
+                <a:latin typeface="Calibri"/>
+                <a:ea typeface="Calibri"/>
+                <a:cs typeface="Calibri"/>
+              </a:rPr>
+              <a:t>A 62% increase from 2021 </a:t>
+            </a:r>
+            <a:r>
+              <a:rPr lang="en-US" sz="1600" dirty="0">
+                <a:latin typeface="Calibri"/>
+                <a:ea typeface="Calibri"/>
+                <a:cs typeface="Calibri"/>
+                <a:hlinkClick r:id="rId3"/>
+              </a:rPr>
+              <a:t>source</a:t>
+            </a:r>
+            <a:endParaRPr lang="en-US" sz="1600">
+              <a:latin typeface="Calibri"/>
+              <a:ea typeface="Calibri"/>
+              <a:cs typeface="Calibri"/>
+            </a:endParaRPr>
+          </a:p>
+          <a:p>
+            <a:r>
+              <a:rPr lang="en-US" dirty="0">
+                <a:latin typeface="Calibri"/>
+                <a:ea typeface="Calibri"/>
+                <a:cs typeface="Calibri"/>
+              </a:rPr>
+              <a:t>DraftKings</a:t>
+            </a:r>
+          </a:p>
+          <a:p>
+            <a:pPr lvl="1">
+              <a:buFont typeface="Courier New" panose="020B0604020202020204" pitchFamily="34" charset="0"/>
+              <a:buChar char="o"/>
+            </a:pPr>
+            <a:r>
+              <a:rPr lang="en-US" dirty="0">
+                <a:latin typeface="Calibri"/>
+                <a:ea typeface="Calibri"/>
+                <a:cs typeface="Calibri"/>
+              </a:rPr>
+              <a:t>1.9 million users in 2022</a:t>
+            </a:r>
+          </a:p>
+          <a:p>
+            <a:pPr lvl="1">
+              <a:buFont typeface="Courier New" panose="020B0604020202020204" pitchFamily="34" charset="0"/>
+              <a:buChar char="o"/>
+            </a:pPr>
+            <a:r>
+              <a:rPr lang="en-US" dirty="0">
+                <a:latin typeface="Calibri"/>
+                <a:ea typeface="Calibri"/>
+                <a:cs typeface="Calibri"/>
+              </a:rPr>
+              <a:t>$2.2 billion in revenue</a:t>
+            </a:r>
+          </a:p>
+          <a:p>
+            <a:pPr lvl="2">
+              <a:buFont typeface="Wingdings" panose="020B0604020202020204" pitchFamily="34" charset="0"/>
+              <a:buChar char="§"/>
+            </a:pPr>
+            <a:r>
+              <a:rPr lang="en-US" sz="1400" dirty="0">
+                <a:latin typeface="Calibri"/>
+                <a:ea typeface="Calibri"/>
+                <a:cs typeface="Calibri"/>
+              </a:rPr>
+              <a:t>A 72% increase from 2021 </a:t>
+            </a:r>
+            <a:r>
+              <a:rPr lang="en-US" sz="1400" dirty="0">
+                <a:latin typeface="Calibri"/>
+                <a:ea typeface="Calibri"/>
+                <a:cs typeface="Calibri"/>
+                <a:hlinkClick r:id="rId4"/>
+              </a:rPr>
+              <a:t>source</a:t>
+            </a:r>
+          </a:p>
+          <a:p>
+            <a:r>
+              <a:rPr lang="en-US" sz="2400" dirty="0" err="1">
                 <a:latin typeface="Calibri"/>
                 <a:ea typeface="Calibri"/>
                 <a:cs typeface="Calibri"/>
@@ -3762,44 +3888,68 @@
               <a:t>BetMGM</a:t>
             </a:r>
             <a:r>
+              <a:rPr lang="en-US" sz="2400" dirty="0">
+                <a:latin typeface="Calibri"/>
+                <a:ea typeface="Calibri"/>
+                <a:cs typeface="Calibri"/>
+              </a:rPr>
+              <a:t>, Caesars Sportsbook, </a:t>
+            </a:r>
+            <a:r>
+              <a:rPr lang="en-US" sz="2400" dirty="0" err="1">
+                <a:latin typeface="Calibri"/>
+                <a:ea typeface="Calibri"/>
+                <a:cs typeface="Calibri"/>
+              </a:rPr>
+              <a:t>PointsBet</a:t>
+            </a:r>
+            <a:r>
+              <a:rPr lang="en-US" sz="2400" dirty="0">
+                <a:latin typeface="Calibri"/>
+                <a:ea typeface="Calibri"/>
+                <a:cs typeface="Calibri"/>
+              </a:rPr>
+              <a:t>, Barstool Sportsbook, </a:t>
+            </a:r>
+            <a:r>
+              <a:rPr lang="en-US" sz="2400" dirty="0" err="1">
+                <a:latin typeface="Calibri"/>
+                <a:ea typeface="Calibri"/>
+                <a:cs typeface="Calibri"/>
+              </a:rPr>
+              <a:t>BetRivers</a:t>
+            </a:r>
+            <a:r>
+              <a:rPr lang="en-US" sz="2400" dirty="0">
+                <a:latin typeface="Calibri"/>
+                <a:ea typeface="Calibri"/>
+                <a:cs typeface="Calibri"/>
+              </a:rPr>
+              <a:t>, FOX Bet, Underdog</a:t>
+            </a:r>
+          </a:p>
+          <a:p>
+            <a:r>
               <a:rPr lang="en-US" dirty="0">
                 <a:latin typeface="Calibri"/>
                 <a:ea typeface="Calibri"/>
                 <a:cs typeface="Calibri"/>
               </a:rPr>
-              <a:t>, Caesars Sportsbook, </a:t>
-            </a:r>
-            <a:r>
-              <a:rPr lang="en-US" dirty="0" err="1">
-                <a:latin typeface="Calibri"/>
-                <a:ea typeface="Calibri"/>
-                <a:cs typeface="Calibri"/>
-              </a:rPr>
-              <a:t>PointsBet</a:t>
-            </a:r>
+              <a:t>24/7?</a:t>
+            </a:r>
+          </a:p>
+          <a:p>
+            <a:pPr lvl="1">
+              <a:buFont typeface="Courier New" panose="020B0604020202020204" pitchFamily="34" charset="0"/>
+              <a:buChar char="o"/>
+            </a:pPr>
             <a:r>
               <a:rPr lang="en-US" dirty="0">
                 <a:latin typeface="Calibri"/>
                 <a:ea typeface="Calibri"/>
                 <a:cs typeface="Calibri"/>
               </a:rPr>
-              <a:t>, Barstool Sportsbook, </a:t>
-            </a:r>
-            <a:r>
-              <a:rPr lang="en-US" dirty="0" err="1">
-                <a:latin typeface="Calibri"/>
-                <a:ea typeface="Calibri"/>
-                <a:cs typeface="Calibri"/>
-              </a:rPr>
-              <a:t>BetRivers</a:t>
-            </a:r>
-            <a:r>
-              <a:rPr lang="en-US" dirty="0">
-                <a:latin typeface="Calibri"/>
-                <a:ea typeface="Calibri"/>
-                <a:cs typeface="Calibri"/>
-              </a:rPr>
-              <a:t>, FOX Bet</a:t>
+              <a:t>Poker?</a:t>
             </a:r>
           </a:p>
         </p:txBody>

</xml_diff>

<commit_message>
add market size slide add data to market validation
</commit_message>
<xml_diff>
--- a/brand-assets/pitch-deck/ChessWagerPitchDeck.pptx
+++ b/brand-assets/pitch-deck/ChessWagerPitchDeck.pptx
@@ -10,9 +10,10 @@
     <p:sldId id="259" r:id="rId4"/>
     <p:sldId id="260" r:id="rId5"/>
     <p:sldId id="263" r:id="rId6"/>
-    <p:sldId id="261" r:id="rId7"/>
-    <p:sldId id="257" r:id="rId8"/>
-    <p:sldId id="262" r:id="rId9"/>
+    <p:sldId id="264" r:id="rId7"/>
+    <p:sldId id="261" r:id="rId8"/>
+    <p:sldId id="257" r:id="rId9"/>
+    <p:sldId id="262" r:id="rId10"/>
   </p:sldIdLst>
   <p:sldSz cx="12192000" cy="6858000"/>
   <p:notesSz cx="6858000" cy="9144000"/>
@@ -122,7 +123,7 @@
 <file path=ppt/revisionInfo.xml><?xml version="1.0" encoding="utf-8"?>
 <p1510:revInfo xmlns:a="http://schemas.openxmlformats.org/drawingml/2006/main" xmlns:r="http://schemas.openxmlformats.org/officeDocument/2006/relationships" xmlns:p1510="http://schemas.microsoft.com/office/powerpoint/2015/10/main">
   <p1510:revLst>
-    <p1510:client id="{1AC1F2C2-5A44-445C-8FCF-DDB3EDB04908}" v="272" dt="2024-09-18T00:26:35.851"/>
+    <p1510:client id="{9039E994-D414-4A7F-B357-3985ED00DD6F}" v="247" dt="2024-09-23T19:11:07.032"/>
   </p1510:revLst>
 </p1510:revInfo>
 </file>
@@ -258,7 +259,7 @@
           <a:p>
             <a:fld id="{846CE7D5-CF57-46EF-B807-FDD0502418D4}" type="datetimeFigureOut">
               <a:rPr lang="en-US" smtClean="0"/>
-              <a:t>9/17/2024</a:t>
+              <a:t>9/23/2024</a:t>
             </a:fld>
             <a:endParaRPr lang="en-US"/>
           </a:p>
@@ -428,7 +429,7 @@
           <a:p>
             <a:fld id="{846CE7D5-CF57-46EF-B807-FDD0502418D4}" type="datetimeFigureOut">
               <a:rPr lang="en-US" smtClean="0"/>
-              <a:t>9/17/2024</a:t>
+              <a:t>9/23/2024</a:t>
             </a:fld>
             <a:endParaRPr lang="en-US"/>
           </a:p>
@@ -608,7 +609,7 @@
           <a:p>
             <a:fld id="{846CE7D5-CF57-46EF-B807-FDD0502418D4}" type="datetimeFigureOut">
               <a:rPr lang="en-US" smtClean="0"/>
-              <a:t>9/17/2024</a:t>
+              <a:t>9/23/2024</a:t>
             </a:fld>
             <a:endParaRPr lang="en-US"/>
           </a:p>
@@ -778,7 +779,7 @@
           <a:p>
             <a:fld id="{846CE7D5-CF57-46EF-B807-FDD0502418D4}" type="datetimeFigureOut">
               <a:rPr lang="en-US" smtClean="0"/>
-              <a:t>9/17/2024</a:t>
+              <a:t>9/23/2024</a:t>
             </a:fld>
             <a:endParaRPr lang="en-US"/>
           </a:p>
@@ -1024,7 +1025,7 @@
           <a:p>
             <a:fld id="{846CE7D5-CF57-46EF-B807-FDD0502418D4}" type="datetimeFigureOut">
               <a:rPr lang="en-US" smtClean="0"/>
-              <a:t>9/17/2024</a:t>
+              <a:t>9/23/2024</a:t>
             </a:fld>
             <a:endParaRPr lang="en-US"/>
           </a:p>
@@ -1256,7 +1257,7 @@
           <a:p>
             <a:fld id="{846CE7D5-CF57-46EF-B807-FDD0502418D4}" type="datetimeFigureOut">
               <a:rPr lang="en-US" smtClean="0"/>
-              <a:t>9/17/2024</a:t>
+              <a:t>9/23/2024</a:t>
             </a:fld>
             <a:endParaRPr lang="en-US"/>
           </a:p>
@@ -1623,7 +1624,7 @@
           <a:p>
             <a:fld id="{846CE7D5-CF57-46EF-B807-FDD0502418D4}" type="datetimeFigureOut">
               <a:rPr lang="en-US" smtClean="0"/>
-              <a:t>9/17/2024</a:t>
+              <a:t>9/23/2024</a:t>
             </a:fld>
             <a:endParaRPr lang="en-US"/>
           </a:p>
@@ -1741,7 +1742,7 @@
           <a:p>
             <a:fld id="{846CE7D5-CF57-46EF-B807-FDD0502418D4}" type="datetimeFigureOut">
               <a:rPr lang="en-US" smtClean="0"/>
-              <a:t>9/17/2024</a:t>
+              <a:t>9/23/2024</a:t>
             </a:fld>
             <a:endParaRPr lang="en-US"/>
           </a:p>
@@ -1836,7 +1837,7 @@
           <a:p>
             <a:fld id="{846CE7D5-CF57-46EF-B807-FDD0502418D4}" type="datetimeFigureOut">
               <a:rPr lang="en-US" smtClean="0"/>
-              <a:t>9/17/2024</a:t>
+              <a:t>9/23/2024</a:t>
             </a:fld>
             <a:endParaRPr lang="en-US"/>
           </a:p>
@@ -2113,7 +2114,7 @@
           <a:p>
             <a:fld id="{846CE7D5-CF57-46EF-B807-FDD0502418D4}" type="datetimeFigureOut">
               <a:rPr lang="en-US" smtClean="0"/>
-              <a:t>9/17/2024</a:t>
+              <a:t>9/23/2024</a:t>
             </a:fld>
             <a:endParaRPr lang="en-US"/>
           </a:p>
@@ -2370,7 +2371,7 @@
           <a:p>
             <a:fld id="{846CE7D5-CF57-46EF-B807-FDD0502418D4}" type="datetimeFigureOut">
               <a:rPr lang="en-US" smtClean="0"/>
-              <a:t>9/17/2024</a:t>
+              <a:t>9/23/2024</a:t>
             </a:fld>
             <a:endParaRPr lang="en-US"/>
           </a:p>
@@ -2583,7 +2584,7 @@
           <a:p>
             <a:fld id="{846CE7D5-CF57-46EF-B807-FDD0502418D4}" type="datetimeFigureOut">
               <a:rPr lang="en-US" smtClean="0"/>
-              <a:t>9/17/2024</a:t>
+              <a:t>9/23/2024</a:t>
             </a:fld>
             <a:endParaRPr lang="en-US"/>
           </a:p>
@@ -3663,7 +3664,7 @@
           <p:cNvPr id="2" name="Title 1">
             <a:extLst>
               <a:ext uri="{FF2B5EF4-FFF2-40B4-BE49-F238E27FC236}">
-                <a16:creationId xmlns:a16="http://schemas.microsoft.com/office/drawing/2014/main" id="{672DC23D-D9A3-D8F8-E8BE-EC9A61771210}"/>
+                <a16:creationId xmlns:a16="http://schemas.microsoft.com/office/drawing/2014/main" id="{D90D74E5-0E88-5C3C-55C0-8E5FFFDC0DC6}"/>
               </a:ext>
             </a:extLst>
           </p:cNvPr>
@@ -3685,7 +3686,7 @@
                 <a:ea typeface="Calibri"/>
                 <a:cs typeface="Calibri"/>
               </a:rPr>
-              <a:t>Market Validation</a:t>
+              <a:t>Market Size for online sports betting</a:t>
             </a:r>
             <a:endParaRPr lang="en-US" dirty="0">
               <a:latin typeface="Calibri"/>
@@ -3700,7 +3701,7 @@
           <p:cNvPr id="3" name="Content Placeholder 2">
             <a:extLst>
               <a:ext uri="{FF2B5EF4-FFF2-40B4-BE49-F238E27FC236}">
-                <a16:creationId xmlns:a16="http://schemas.microsoft.com/office/drawing/2014/main" id="{98FA3155-6D78-AF21-A57F-0027ACDF695A}"/>
+                <a16:creationId xmlns:a16="http://schemas.microsoft.com/office/drawing/2014/main" id="{35B60166-094C-97C5-CB11-8D18EFEBB6AF}"/>
               </a:ext>
             </a:extLst>
           </p:cNvPr>
@@ -3714,17 +3715,48 @@
         <p:spPr/>
         <p:txBody>
           <a:bodyPr vert="horz" lIns="91440" tIns="45720" rIns="91440" bIns="45720" rtlCol="0" anchor="t">
-            <a:normAutofit fontScale="92500" lnSpcReduction="20000"/>
+            <a:normAutofit/>
           </a:bodyPr>
           <a:lstStyle/>
           <a:p>
             <a:r>
-              <a:rPr lang="en-US">
-                <a:latin typeface="Calibri"/>
-                <a:ea typeface="Calibri"/>
-                <a:cs typeface="Calibri"/>
-              </a:rPr>
-              <a:t>US sport betting revenue reached $7.4 billion in 2022 </a:t>
+              <a:rPr lang="en-US" dirty="0">
+                <a:latin typeface="Calibri"/>
+                <a:ea typeface="Calibri"/>
+                <a:cs typeface="Calibri"/>
+              </a:rPr>
+              <a:t>2022: $35.5 billion?????? Estimation, no source</a:t>
+            </a:r>
+          </a:p>
+          <a:p>
+            <a:r>
+              <a:rPr lang="en-US" dirty="0">
+                <a:latin typeface="Calibri"/>
+                <a:ea typeface="Calibri"/>
+                <a:cs typeface="Calibri"/>
+              </a:rPr>
+              <a:t>2023: $42 billion</a:t>
+            </a:r>
+            <a:endParaRPr lang="en-US" dirty="0"/>
+          </a:p>
+          <a:p>
+            <a:r>
+              <a:rPr lang="en-US" dirty="0">
+                <a:latin typeface="Calibri"/>
+                <a:ea typeface="Calibri"/>
+                <a:cs typeface="Calibri"/>
+              </a:rPr>
+              <a:t>2024: approx. $48 billion</a:t>
+            </a:r>
+          </a:p>
+          <a:p>
+            <a:r>
+              <a:rPr lang="en-US" dirty="0">
+                <a:latin typeface="Calibri"/>
+                <a:ea typeface="Calibri"/>
+                <a:cs typeface="Calibri"/>
+              </a:rPr>
+              <a:t>Estimated to reach $83 billion in 2029 </a:t>
             </a:r>
             <a:r>
               <a:rPr lang="en-US" dirty="0">
@@ -3741,223 +3773,12 @@
               <a:cs typeface="Calibri"/>
             </a:endParaRPr>
           </a:p>
-          <a:p>
-            <a:r>
-              <a:rPr lang="en-US">
-                <a:latin typeface="Calibri"/>
-                <a:ea typeface="Calibri"/>
-                <a:cs typeface="Calibri"/>
-              </a:rPr>
-              <a:t>FanDuel</a:t>
-            </a:r>
-            <a:endParaRPr lang="en-US">
-              <a:latin typeface="Aptos" panose="020B0004020202020204"/>
-              <a:ea typeface="Calibri"/>
-              <a:cs typeface="Calibri"/>
-            </a:endParaRPr>
-          </a:p>
-          <a:p>
-            <a:pPr lvl="1">
-              <a:buFont typeface="Courier New" panose="020B0604020202020204" pitchFamily="34" charset="0"/>
-              <a:buChar char="o"/>
-            </a:pPr>
-            <a:r>
-              <a:rPr lang="en-US" dirty="0">
-                <a:latin typeface="Calibri"/>
-                <a:ea typeface="Calibri"/>
-                <a:cs typeface="Calibri"/>
-              </a:rPr>
-              <a:t>3 million users in 2022</a:t>
-            </a:r>
-          </a:p>
-          <a:p>
-            <a:pPr lvl="1">
-              <a:buFont typeface="Courier New" panose="020B0604020202020204" pitchFamily="34" charset="0"/>
-              <a:buChar char="o"/>
-            </a:pPr>
-            <a:r>
-              <a:rPr lang="en-US" sz="2000" dirty="0">
-                <a:latin typeface="Calibri"/>
-                <a:ea typeface="Calibri"/>
-                <a:cs typeface="Calibri"/>
-              </a:rPr>
-              <a:t>$3.23 billion in revenue</a:t>
-            </a:r>
-            <a:endParaRPr lang="en-US" dirty="0">
-              <a:latin typeface="Calibri"/>
-              <a:ea typeface="Calibri"/>
-              <a:cs typeface="Calibri"/>
-            </a:endParaRPr>
-          </a:p>
-          <a:p>
-            <a:pPr lvl="2">
-              <a:buFont typeface="Wingdings" panose="020B0604020202020204" pitchFamily="34" charset="0"/>
-              <a:buChar char="§"/>
-            </a:pPr>
-            <a:r>
-              <a:rPr lang="en-US" sz="1600" dirty="0">
-                <a:latin typeface="Calibri"/>
-                <a:ea typeface="Calibri"/>
-                <a:cs typeface="Calibri"/>
-              </a:rPr>
-              <a:t>A 62% increase from 2021 </a:t>
-            </a:r>
-            <a:r>
-              <a:rPr lang="en-US" sz="1600" dirty="0">
-                <a:latin typeface="Calibri"/>
-                <a:ea typeface="Calibri"/>
-                <a:cs typeface="Calibri"/>
-                <a:hlinkClick r:id="rId3"/>
-              </a:rPr>
-              <a:t>source</a:t>
-            </a:r>
-            <a:endParaRPr lang="en-US" sz="1600">
-              <a:latin typeface="Calibri"/>
-              <a:ea typeface="Calibri"/>
-              <a:cs typeface="Calibri"/>
-            </a:endParaRPr>
-          </a:p>
-          <a:p>
-            <a:r>
-              <a:rPr lang="en-US" dirty="0">
-                <a:latin typeface="Calibri"/>
-                <a:ea typeface="Calibri"/>
-                <a:cs typeface="Calibri"/>
-              </a:rPr>
-              <a:t>DraftKings</a:t>
-            </a:r>
-          </a:p>
-          <a:p>
-            <a:pPr lvl="1">
-              <a:buFont typeface="Courier New" panose="020B0604020202020204" pitchFamily="34" charset="0"/>
-              <a:buChar char="o"/>
-            </a:pPr>
-            <a:r>
-              <a:rPr lang="en-US" dirty="0">
-                <a:latin typeface="Calibri"/>
-                <a:ea typeface="Calibri"/>
-                <a:cs typeface="Calibri"/>
-              </a:rPr>
-              <a:t>1.9 million users in 2022</a:t>
-            </a:r>
-          </a:p>
-          <a:p>
-            <a:pPr lvl="1">
-              <a:buFont typeface="Courier New" panose="020B0604020202020204" pitchFamily="34" charset="0"/>
-              <a:buChar char="o"/>
-            </a:pPr>
-            <a:r>
-              <a:rPr lang="en-US" dirty="0">
-                <a:latin typeface="Calibri"/>
-                <a:ea typeface="Calibri"/>
-                <a:cs typeface="Calibri"/>
-              </a:rPr>
-              <a:t>$2.2 billion in revenue</a:t>
-            </a:r>
-          </a:p>
-          <a:p>
-            <a:pPr lvl="2">
-              <a:buFont typeface="Wingdings" panose="020B0604020202020204" pitchFamily="34" charset="0"/>
-              <a:buChar char="§"/>
-            </a:pPr>
-            <a:r>
-              <a:rPr lang="en-US" sz="1400" dirty="0">
-                <a:latin typeface="Calibri"/>
-                <a:ea typeface="Calibri"/>
-                <a:cs typeface="Calibri"/>
-              </a:rPr>
-              <a:t>A 72% increase from 2021 </a:t>
-            </a:r>
-            <a:r>
-              <a:rPr lang="en-US" sz="1400" dirty="0">
-                <a:latin typeface="Calibri"/>
-                <a:ea typeface="Calibri"/>
-                <a:cs typeface="Calibri"/>
-                <a:hlinkClick r:id="rId4"/>
-              </a:rPr>
-              <a:t>source</a:t>
-            </a:r>
-          </a:p>
-          <a:p>
-            <a:r>
-              <a:rPr lang="en-US" sz="2400" dirty="0" err="1">
-                <a:latin typeface="Calibri"/>
-                <a:ea typeface="Calibri"/>
-                <a:cs typeface="Calibri"/>
-              </a:rPr>
-              <a:t>BetMGM</a:t>
-            </a:r>
-            <a:r>
-              <a:rPr lang="en-US" sz="2400" dirty="0">
-                <a:latin typeface="Calibri"/>
-                <a:ea typeface="Calibri"/>
-                <a:cs typeface="Calibri"/>
-              </a:rPr>
-              <a:t>, Caesars Sportsbook, </a:t>
-            </a:r>
-            <a:r>
-              <a:rPr lang="en-US" sz="2400" dirty="0" err="1">
-                <a:latin typeface="Calibri"/>
-                <a:ea typeface="Calibri"/>
-                <a:cs typeface="Calibri"/>
-              </a:rPr>
-              <a:t>PointsBet</a:t>
-            </a:r>
-            <a:r>
-              <a:rPr lang="en-US" sz="2400" dirty="0">
-                <a:latin typeface="Calibri"/>
-                <a:ea typeface="Calibri"/>
-                <a:cs typeface="Calibri"/>
-              </a:rPr>
-              <a:t>, Barstool Sportsbook, </a:t>
-            </a:r>
-            <a:r>
-              <a:rPr lang="en-US" sz="2400" dirty="0" err="1">
-                <a:latin typeface="Calibri"/>
-                <a:ea typeface="Calibri"/>
-                <a:cs typeface="Calibri"/>
-              </a:rPr>
-              <a:t>BetRivers</a:t>
-            </a:r>
-            <a:r>
-              <a:rPr lang="en-US" sz="2400" dirty="0">
-                <a:latin typeface="Calibri"/>
-                <a:ea typeface="Calibri"/>
-                <a:cs typeface="Calibri"/>
-              </a:rPr>
-              <a:t>, FOX Bet, Underdog</a:t>
-            </a:r>
-          </a:p>
-          <a:p>
-            <a:r>
-              <a:rPr lang="en-US" dirty="0">
-                <a:latin typeface="Calibri"/>
-                <a:ea typeface="Calibri"/>
-                <a:cs typeface="Calibri"/>
-              </a:rPr>
-              <a:t>24/7?</a:t>
-            </a:r>
-          </a:p>
-          <a:p>
-            <a:pPr lvl="1">
-              <a:buFont typeface="Courier New" panose="020B0604020202020204" pitchFamily="34" charset="0"/>
-              <a:buChar char="o"/>
-            </a:pPr>
-            <a:r>
-              <a:rPr lang="en-US" dirty="0">
-                <a:latin typeface="Calibri"/>
-                <a:ea typeface="Calibri"/>
-                <a:cs typeface="Calibri"/>
-              </a:rPr>
-              <a:t>Poker?</a:t>
-            </a:r>
-          </a:p>
         </p:txBody>
       </p:sp>
     </p:spTree>
     <p:extLst>
       <p:ext uri="{BB962C8B-B14F-4D97-AF65-F5344CB8AC3E}">
-        <p14:creationId xmlns:p14="http://schemas.microsoft.com/office/powerpoint/2010/main" val="3581935933"/>
+        <p14:creationId xmlns:p14="http://schemas.microsoft.com/office/powerpoint/2010/main" val="2621122343"/>
       </p:ext>
     </p:extLst>
   </p:cSld>
@@ -3989,6 +3810,380 @@
           <p:cNvPr id="2" name="Title 1">
             <a:extLst>
               <a:ext uri="{FF2B5EF4-FFF2-40B4-BE49-F238E27FC236}">
+                <a16:creationId xmlns:a16="http://schemas.microsoft.com/office/drawing/2014/main" id="{672DC23D-D9A3-D8F8-E8BE-EC9A61771210}"/>
+              </a:ext>
+            </a:extLst>
+          </p:cNvPr>
+          <p:cNvSpPr>
+            <a:spLocks noGrp="1"/>
+          </p:cNvSpPr>
+          <p:nvPr>
+            <p:ph type="title"/>
+          </p:nvPr>
+        </p:nvSpPr>
+        <p:spPr/>
+        <p:txBody>
+          <a:bodyPr/>
+          <a:lstStyle/>
+          <a:p>
+            <a:r>
+              <a:rPr lang="en-US" b="1" dirty="0">
+                <a:latin typeface="Calibri"/>
+                <a:ea typeface="Calibri"/>
+                <a:cs typeface="Calibri"/>
+              </a:rPr>
+              <a:t>Market Validation</a:t>
+            </a:r>
+            <a:endParaRPr lang="en-US" dirty="0">
+              <a:latin typeface="Calibri"/>
+              <a:ea typeface="Calibri"/>
+              <a:cs typeface="Calibri"/>
+            </a:endParaRPr>
+          </a:p>
+        </p:txBody>
+      </p:sp>
+      <p:sp>
+        <p:nvSpPr>
+          <p:cNvPr id="3" name="Content Placeholder 2">
+            <a:extLst>
+              <a:ext uri="{FF2B5EF4-FFF2-40B4-BE49-F238E27FC236}">
+                <a16:creationId xmlns:a16="http://schemas.microsoft.com/office/drawing/2014/main" id="{98FA3155-6D78-AF21-A57F-0027ACDF695A}"/>
+              </a:ext>
+            </a:extLst>
+          </p:cNvPr>
+          <p:cNvSpPr>
+            <a:spLocks noGrp="1"/>
+          </p:cNvSpPr>
+          <p:nvPr>
+            <p:ph idx="1"/>
+          </p:nvPr>
+        </p:nvSpPr>
+        <p:spPr/>
+        <p:txBody>
+          <a:bodyPr vert="horz" lIns="91440" tIns="45720" rIns="91440" bIns="45720" rtlCol="0" anchor="t">
+            <a:normAutofit fontScale="85000" lnSpcReduction="20000"/>
+          </a:bodyPr>
+          <a:lstStyle/>
+          <a:p>
+            <a:r>
+              <a:rPr lang="en-US">
+                <a:latin typeface="Calibri"/>
+                <a:ea typeface="Calibri"/>
+                <a:cs typeface="Calibri"/>
+              </a:rPr>
+              <a:t>US sport betting revenue was $7.4 billion in 2022 </a:t>
+            </a:r>
+            <a:r>
+              <a:rPr lang="en-US" dirty="0">
+                <a:latin typeface="Calibri"/>
+                <a:ea typeface="Calibri"/>
+                <a:cs typeface="Calibri"/>
+                <a:hlinkClick r:id="rId2"/>
+              </a:rPr>
+              <a:t>source</a:t>
+            </a:r>
+            <a:endParaRPr lang="en-US" dirty="0">
+              <a:latin typeface="Calibri"/>
+              <a:ea typeface="Calibri"/>
+              <a:cs typeface="Calibri"/>
+            </a:endParaRPr>
+          </a:p>
+          <a:p>
+            <a:pPr lvl="1">
+              <a:buFont typeface="Courier New" panose="020B0604020202020204" pitchFamily="34" charset="0"/>
+              <a:buChar char="o"/>
+            </a:pPr>
+            <a:r>
+              <a:rPr lang="en-US" dirty="0">
+                <a:latin typeface="Calibri"/>
+                <a:ea typeface="Calibri"/>
+                <a:cs typeface="Calibri"/>
+              </a:rPr>
+              <a:t>It reached $10.92 billion in 2023 </a:t>
+            </a:r>
+            <a:r>
+              <a:rPr lang="en-US" dirty="0">
+                <a:latin typeface="Calibri"/>
+                <a:ea typeface="Calibri"/>
+                <a:cs typeface="Calibri"/>
+                <a:hlinkClick r:id="rId3"/>
+              </a:rPr>
+              <a:t>source</a:t>
+            </a:r>
+            <a:endParaRPr lang="en-US"/>
+          </a:p>
+          <a:p>
+            <a:r>
+              <a:rPr lang="en-US" dirty="0">
+                <a:latin typeface="Calibri"/>
+                <a:ea typeface="Calibri"/>
+                <a:cs typeface="Calibri"/>
+              </a:rPr>
+              <a:t>90% of sports betting is online </a:t>
+            </a:r>
+            <a:r>
+              <a:rPr lang="en-US" dirty="0">
+                <a:latin typeface="Calibri"/>
+                <a:ea typeface="Calibri"/>
+                <a:cs typeface="Calibri"/>
+                <a:hlinkClick r:id="rId3"/>
+              </a:rPr>
+              <a:t>source</a:t>
+            </a:r>
+            <a:endParaRPr lang="en-US" dirty="0">
+              <a:latin typeface="Calibri"/>
+              <a:ea typeface="Calibri"/>
+              <a:cs typeface="Calibri"/>
+            </a:endParaRPr>
+          </a:p>
+          <a:p>
+            <a:r>
+              <a:rPr lang="en-US" dirty="0">
+                <a:latin typeface="Calibri"/>
+                <a:ea typeface="Calibri"/>
+                <a:cs typeface="Calibri"/>
+              </a:rPr>
+              <a:t>FanDuel</a:t>
+            </a:r>
+            <a:endParaRPr lang="en-US" dirty="0">
+              <a:latin typeface="Aptos" panose="020B0004020202020204"/>
+              <a:ea typeface="Calibri"/>
+              <a:cs typeface="Calibri"/>
+            </a:endParaRPr>
+          </a:p>
+          <a:p>
+            <a:pPr lvl="1">
+              <a:buFont typeface="Courier New" panose="020B0604020202020204" pitchFamily="34" charset="0"/>
+              <a:buChar char="o"/>
+            </a:pPr>
+            <a:r>
+              <a:rPr lang="en-US" dirty="0">
+                <a:latin typeface="Calibri"/>
+                <a:ea typeface="Calibri"/>
+                <a:cs typeface="Calibri"/>
+              </a:rPr>
+              <a:t>3 million users in 2022</a:t>
+            </a:r>
+          </a:p>
+          <a:p>
+            <a:pPr lvl="1">
+              <a:buFont typeface="Courier New" panose="020B0604020202020204" pitchFamily="34" charset="0"/>
+              <a:buChar char="o"/>
+            </a:pPr>
+            <a:r>
+              <a:rPr lang="en-US" sz="2000" dirty="0">
+                <a:latin typeface="Calibri"/>
+                <a:ea typeface="Calibri"/>
+                <a:cs typeface="Calibri"/>
+              </a:rPr>
+              <a:t>$3.23 billion in revenue</a:t>
+            </a:r>
+            <a:endParaRPr lang="en-US" dirty="0">
+              <a:latin typeface="Calibri"/>
+              <a:ea typeface="Calibri"/>
+              <a:cs typeface="Calibri"/>
+            </a:endParaRPr>
+          </a:p>
+          <a:p>
+            <a:pPr lvl="2">
+              <a:buFont typeface="Wingdings" panose="020B0604020202020204" pitchFamily="34" charset="0"/>
+              <a:buChar char="§"/>
+            </a:pPr>
+            <a:r>
+              <a:rPr lang="en-US" sz="1600" dirty="0">
+                <a:latin typeface="Calibri"/>
+                <a:ea typeface="Calibri"/>
+                <a:cs typeface="Calibri"/>
+              </a:rPr>
+              <a:t>A 62% increase from 2021 </a:t>
+            </a:r>
+            <a:r>
+              <a:rPr lang="en-US" sz="1600" dirty="0">
+                <a:latin typeface="Calibri"/>
+                <a:ea typeface="Calibri"/>
+                <a:cs typeface="Calibri"/>
+                <a:hlinkClick r:id="rId4"/>
+              </a:rPr>
+              <a:t>source</a:t>
+            </a:r>
+            <a:endParaRPr lang="en-US" sz="1600">
+              <a:latin typeface="Calibri"/>
+              <a:ea typeface="Calibri"/>
+              <a:cs typeface="Calibri"/>
+            </a:endParaRPr>
+          </a:p>
+          <a:p>
+            <a:r>
+              <a:rPr lang="en-US" dirty="0">
+                <a:latin typeface="Calibri"/>
+                <a:ea typeface="Calibri"/>
+                <a:cs typeface="Calibri"/>
+              </a:rPr>
+              <a:t>DraftKings</a:t>
+            </a:r>
+          </a:p>
+          <a:p>
+            <a:pPr lvl="1">
+              <a:buFont typeface="Courier New" panose="020B0604020202020204" pitchFamily="34" charset="0"/>
+              <a:buChar char="o"/>
+            </a:pPr>
+            <a:r>
+              <a:rPr lang="en-US" dirty="0">
+                <a:latin typeface="Calibri"/>
+                <a:ea typeface="Calibri"/>
+                <a:cs typeface="Calibri"/>
+              </a:rPr>
+              <a:t>1.9 million users in 2022</a:t>
+            </a:r>
+          </a:p>
+          <a:p>
+            <a:pPr lvl="1">
+              <a:buFont typeface="Courier New" panose="020B0604020202020204" pitchFamily="34" charset="0"/>
+              <a:buChar char="o"/>
+            </a:pPr>
+            <a:r>
+              <a:rPr lang="en-US" dirty="0">
+                <a:latin typeface="Calibri"/>
+                <a:ea typeface="Calibri"/>
+                <a:cs typeface="Calibri"/>
+              </a:rPr>
+              <a:t>$2.2 billion in revenue</a:t>
+            </a:r>
+          </a:p>
+          <a:p>
+            <a:pPr lvl="2">
+              <a:buFont typeface="Wingdings" panose="020B0604020202020204" pitchFamily="34" charset="0"/>
+              <a:buChar char="§"/>
+            </a:pPr>
+            <a:r>
+              <a:rPr lang="en-US" sz="1400" dirty="0">
+                <a:latin typeface="Calibri"/>
+                <a:ea typeface="Calibri"/>
+                <a:cs typeface="Calibri"/>
+              </a:rPr>
+              <a:t>A 72% increase from 2021 </a:t>
+            </a:r>
+            <a:r>
+              <a:rPr lang="en-US" sz="1400" dirty="0">
+                <a:latin typeface="Calibri"/>
+                <a:ea typeface="Calibri"/>
+                <a:cs typeface="Calibri"/>
+                <a:hlinkClick r:id="rId5"/>
+              </a:rPr>
+              <a:t>source</a:t>
+            </a:r>
+          </a:p>
+          <a:p>
+            <a:r>
+              <a:rPr lang="en-US" sz="2400" dirty="0" err="1">
+                <a:latin typeface="Calibri"/>
+                <a:ea typeface="Calibri"/>
+                <a:cs typeface="Calibri"/>
+              </a:rPr>
+              <a:t>BetMGM</a:t>
+            </a:r>
+            <a:r>
+              <a:rPr lang="en-US" sz="2400" dirty="0">
+                <a:latin typeface="Calibri"/>
+                <a:ea typeface="Calibri"/>
+                <a:cs typeface="Calibri"/>
+              </a:rPr>
+              <a:t>, Caesars Sportsbook, </a:t>
+            </a:r>
+            <a:r>
+              <a:rPr lang="en-US" sz="2400" dirty="0" err="1">
+                <a:latin typeface="Calibri"/>
+                <a:ea typeface="Calibri"/>
+                <a:cs typeface="Calibri"/>
+              </a:rPr>
+              <a:t>PointsBet</a:t>
+            </a:r>
+            <a:r>
+              <a:rPr lang="en-US" sz="2400" dirty="0">
+                <a:latin typeface="Calibri"/>
+                <a:ea typeface="Calibri"/>
+                <a:cs typeface="Calibri"/>
+              </a:rPr>
+              <a:t>, Barstool Sportsbook, </a:t>
+            </a:r>
+            <a:r>
+              <a:rPr lang="en-US" sz="2400" dirty="0" err="1">
+                <a:latin typeface="Calibri"/>
+                <a:ea typeface="Calibri"/>
+                <a:cs typeface="Calibri"/>
+              </a:rPr>
+              <a:t>BetRivers</a:t>
+            </a:r>
+            <a:r>
+              <a:rPr lang="en-US" sz="2400" dirty="0">
+                <a:latin typeface="Calibri"/>
+                <a:ea typeface="Calibri"/>
+                <a:cs typeface="Calibri"/>
+              </a:rPr>
+              <a:t>, FOX Bet, Underdog</a:t>
+            </a:r>
+          </a:p>
+          <a:p>
+            <a:r>
+              <a:rPr lang="en-US" dirty="0">
+                <a:latin typeface="Calibri"/>
+                <a:ea typeface="Calibri"/>
+                <a:cs typeface="Calibri"/>
+              </a:rPr>
+              <a:t>24/7?</a:t>
+            </a:r>
+          </a:p>
+          <a:p>
+            <a:pPr lvl="1">
+              <a:buFont typeface="Courier New" panose="020B0604020202020204" pitchFamily="34" charset="0"/>
+              <a:buChar char="o"/>
+            </a:pPr>
+            <a:r>
+              <a:rPr lang="en-US" dirty="0">
+                <a:latin typeface="Calibri"/>
+                <a:ea typeface="Calibri"/>
+                <a:cs typeface="Calibri"/>
+              </a:rPr>
+              <a:t>Poker?</a:t>
+            </a:r>
+          </a:p>
+        </p:txBody>
+      </p:sp>
+    </p:spTree>
+    <p:extLst>
+      <p:ext uri="{BB962C8B-B14F-4D97-AF65-F5344CB8AC3E}">
+        <p14:creationId xmlns:p14="http://schemas.microsoft.com/office/powerpoint/2010/main" val="3581935933"/>
+      </p:ext>
+    </p:extLst>
+  </p:cSld>
+  <p:clrMapOvr>
+    <a:masterClrMapping/>
+  </p:clrMapOvr>
+</p:sld>
+</file>
+
+<file path=ppt/slides/slide8.xml><?xml version="1.0" encoding="utf-8"?>
+<p:sld xmlns:a="http://schemas.openxmlformats.org/drawingml/2006/main" xmlns:r="http://schemas.openxmlformats.org/officeDocument/2006/relationships" xmlns:p="http://schemas.openxmlformats.org/presentationml/2006/main">
+  <p:cSld>
+    <p:spTree>
+      <p:nvGrpSpPr>
+        <p:cNvPr id="1" name=""/>
+        <p:cNvGrpSpPr/>
+        <p:nvPr/>
+      </p:nvGrpSpPr>
+      <p:grpSpPr>
+        <a:xfrm>
+          <a:off x="0" y="0"/>
+          <a:ext cx="0" cy="0"/>
+          <a:chOff x="0" y="0"/>
+          <a:chExt cx="0" cy="0"/>
+        </a:xfrm>
+      </p:grpSpPr>
+      <p:sp>
+        <p:nvSpPr>
+          <p:cNvPr id="2" name="Title 1">
+            <a:extLst>
+              <a:ext uri="{FF2B5EF4-FFF2-40B4-BE49-F238E27FC236}">
                 <a16:creationId xmlns:a16="http://schemas.microsoft.com/office/drawing/2014/main" id="{42E68F69-B2D6-AA67-6492-F4BD1D49458E}"/>
               </a:ext>
             </a:extLst>
@@ -4189,7 +4384,7 @@
 </p:sld>
 </file>
 
-<file path=ppt/slides/slide8.xml><?xml version="1.0" encoding="utf-8"?>
+<file path=ppt/slides/slide9.xml><?xml version="1.0" encoding="utf-8"?>
 <p:sld xmlns:a="http://schemas.openxmlformats.org/drawingml/2006/main" xmlns:r="http://schemas.openxmlformats.org/officeDocument/2006/relationships" xmlns:p="http://schemas.openxmlformats.org/presentationml/2006/main">
   <p:cSld>
     <p:spTree>

</xml_diff>